<commit_message>
Update PPT and BLS.ipynb
</commit_message>
<xml_diff>
--- a/Excel Pain Points.pptx
+++ b/Excel Pain Points.pptx
@@ -3143,6 +3143,14 @@
             </a:r>
           </a:p>
           <a:p>
+            <a:r>
+              <a:rPr lang="en-US" dirty="0" smtClean="0"/>
+              <a:t>https://</a:t>
+            </a:r>
+            <a:r>
+              <a:rPr lang="en-US" dirty="0" err="1" smtClean="0"/>
+              <a:t>www.thedataincubator.com</a:t>
+            </a:r>
             <a:endParaRPr lang="en-US" dirty="0"/>
           </a:p>
         </p:txBody>
@@ -3157,6 +3165,13 @@
   <p:clrMapOvr>
     <a:masterClrMapping/>
   </p:clrMapOvr>
+  <p:timing>
+    <p:tnLst>
+      <p:par>
+        <p:cTn xmlns:p14="http://schemas.microsoft.com/office/powerpoint/2010/main" id="1" dur="indefinite" restart="never" nodeType="tmRoot"/>
+      </p:par>
+    </p:tnLst>
+  </p:timing>
 </p:sld>
 </file>
 
@@ -3238,8 +3253,8 @@
         </p:nvSpPr>
         <p:spPr>
           <a:xfrm>
-            <a:off x="457200" y="2198077"/>
-            <a:ext cx="8229600" cy="3928086"/>
+            <a:off x="457200" y="2119276"/>
+            <a:ext cx="8229600" cy="4006887"/>
           </a:xfrm>
         </p:spPr>
         <p:txBody>
@@ -3450,6 +3465,13 @@
   <p:clrMapOvr>
     <a:masterClrMapping/>
   </p:clrMapOvr>
+  <p:timing>
+    <p:tnLst>
+      <p:par>
+        <p:cTn xmlns:p14="http://schemas.microsoft.com/office/powerpoint/2010/main" id="1" dur="indefinite" restart="never" nodeType="tmRoot"/>
+      </p:par>
+    </p:tnLst>
+  </p:timing>
 </p:sld>
 </file>
 
@@ -3537,7 +3559,7 @@
                   </a:schemeClr>
                 </a:solidFill>
               </a:rPr>
-              <a:t>Here's employment data from the Bureau of Labor Statistics</a:t>
+              <a:t>Employment data from the Bureau of Labor Statistics:</a:t>
             </a:r>
             <a:br>
               <a:rPr lang="en-US" sz="2000" dirty="0" smtClean="0">
@@ -3788,6 +3810,13 @@
   <p:clrMapOvr>
     <a:masterClrMapping/>
   </p:clrMapOvr>
+  <p:timing>
+    <p:tnLst>
+      <p:par>
+        <p:cTn xmlns:p14="http://schemas.microsoft.com/office/powerpoint/2010/main" id="1" dur="indefinite" restart="never" nodeType="tmRoot"/>
+      </p:par>
+    </p:tnLst>
+  </p:timing>
 </p:sld>
 </file>
 
@@ -3984,7 +4013,7 @@
                   </a:schemeClr>
                 </a:solidFill>
               </a:rPr>
-              <a:t>salary = wage * (hours * 1.5 overtime)</a:t>
+              <a:t>salary = wage * (hours + 1.5 * overtime)</a:t>
             </a:r>
             <a:endParaRPr lang="en-US" sz="1800" dirty="0">
               <a:solidFill>
@@ -4031,6 +4060,13 @@
   <p:clrMapOvr>
     <a:masterClrMapping/>
   </p:clrMapOvr>
+  <p:timing>
+    <p:tnLst>
+      <p:par>
+        <p:cTn xmlns:p14="http://schemas.microsoft.com/office/powerpoint/2010/main" id="1" dur="indefinite" restart="never" nodeType="tmRoot"/>
+      </p:par>
+    </p:tnLst>
+  </p:timing>
 </p:sld>
 </file>
 
@@ -4382,7 +4418,40 @@
                   </a:schemeClr>
                 </a:solidFill>
               </a:rPr>
-              <a:t>this analysis each week as the government updates </a:t>
+              <a:t>this analysis </a:t>
+            </a:r>
+            <a:r>
+              <a:rPr lang="en-US">
+                <a:solidFill>
+                  <a:schemeClr val="tx1">
+                    <a:lumMod val="65000"/>
+                    <a:lumOff val="35000"/>
+                  </a:schemeClr>
+                </a:solidFill>
+              </a:rPr>
+              <a:t>each </a:t>
+            </a:r>
+            <a:r>
+              <a:rPr lang="en-US" smtClean="0">
+                <a:solidFill>
+                  <a:schemeClr val="tx1">
+                    <a:lumMod val="65000"/>
+                    <a:lumOff val="35000"/>
+                  </a:schemeClr>
+                </a:solidFill>
+              </a:rPr>
+              <a:t>month as </a:t>
+            </a:r>
+            <a:r>
+              <a:rPr lang="en-US" dirty="0">
+                <a:solidFill>
+                  <a:schemeClr val="tx1">
+                    <a:lumMod val="65000"/>
+                    <a:lumOff val="35000"/>
+                  </a:schemeClr>
+                </a:solidFill>
+              </a:rPr>
+              <a:t>the government updates </a:t>
             </a:r>
             <a:r>
               <a:rPr lang="en-US" dirty="0" smtClean="0">
@@ -4475,6 +4544,13 @@
   <p:clrMapOvr>
     <a:masterClrMapping/>
   </p:clrMapOvr>
+  <p:timing>
+    <p:tnLst>
+      <p:par>
+        <p:cTn xmlns:p14="http://schemas.microsoft.com/office/powerpoint/2010/main" id="1" dur="indefinite" restart="never" nodeType="tmRoot"/>
+      </p:par>
+    </p:tnLst>
+  </p:timing>
 </p:sld>
 </file>
 

</xml_diff>